<commit_message>
updated the demo ppt
</commit_message>
<xml_diff>
--- a/demo.pptx
+++ b/demo.pptx
@@ -11,7 +11,6 @@
     <p:sldId id="259" r:id="rId5"/>
     <p:sldId id="260" r:id="rId6"/>
     <p:sldId id="261" r:id="rId7"/>
-    <p:sldId id="262" r:id="rId8"/>
   </p:sldIdLst>
   <p:sldSz cx="9144000" cy="6858000" type="screen4x3"/>
   <p:notesSz cx="6858000" cy="9144000"/>
@@ -350,7 +349,7 @@
           <a:p>
             <a:fld id="{CEA4F80E-EF3C-4D0E-A7E6-C20606EE442A}" type="datetimeFigureOut">
               <a:rPr lang="en-US" smtClean="0"/>
-              <a:t>9/26/2010</a:t>
+              <a:t>12/13/2010</a:t>
             </a:fld>
             <a:endParaRPr lang="en-US"/>
           </a:p>
@@ -520,7 +519,7 @@
           <a:p>
             <a:fld id="{CEA4F80E-EF3C-4D0E-A7E6-C20606EE442A}" type="datetimeFigureOut">
               <a:rPr lang="en-US" smtClean="0"/>
-              <a:t>9/26/2010</a:t>
+              <a:t>12/13/2010</a:t>
             </a:fld>
             <a:endParaRPr lang="en-US"/>
           </a:p>
@@ -695,7 +694,7 @@
           <a:p>
             <a:fld id="{CEA4F80E-EF3C-4D0E-A7E6-C20606EE442A}" type="datetimeFigureOut">
               <a:rPr lang="en-US" smtClean="0"/>
-              <a:t>9/26/2010</a:t>
+              <a:t>12/13/2010</a:t>
             </a:fld>
             <a:endParaRPr lang="en-US"/>
           </a:p>
@@ -860,7 +859,7 @@
           <a:p>
             <a:fld id="{CEA4F80E-EF3C-4D0E-A7E6-C20606EE442A}" type="datetimeFigureOut">
               <a:rPr lang="en-US" smtClean="0"/>
-              <a:t>9/26/2010</a:t>
+              <a:t>12/13/2010</a:t>
             </a:fld>
             <a:endParaRPr lang="en-US"/>
           </a:p>
@@ -1117,7 +1116,7 @@
           <a:p>
             <a:fld id="{CEA4F80E-EF3C-4D0E-A7E6-C20606EE442A}" type="datetimeFigureOut">
               <a:rPr lang="en-US" smtClean="0"/>
-              <a:t>9/26/2010</a:t>
+              <a:t>12/13/2010</a:t>
             </a:fld>
             <a:endParaRPr lang="en-US"/>
           </a:p>
@@ -1257,7 +1256,7 @@
           <a:p>
             <a:fld id="{CEA4F80E-EF3C-4D0E-A7E6-C20606EE442A}" type="datetimeFigureOut">
               <a:rPr lang="en-US" smtClean="0"/>
-              <a:t>9/26/2010</a:t>
+              <a:t>12/13/2010</a:t>
             </a:fld>
             <a:endParaRPr lang="en-US"/>
           </a:p>
@@ -1907,7 +1906,7 @@
           <a:p>
             <a:fld id="{CEA4F80E-EF3C-4D0E-A7E6-C20606EE442A}" type="datetimeFigureOut">
               <a:rPr lang="en-US" smtClean="0"/>
-              <a:t>9/26/2010</a:t>
+              <a:t>12/13/2010</a:t>
             </a:fld>
             <a:endParaRPr lang="en-US"/>
           </a:p>
@@ -2020,7 +2019,7 @@
           <a:p>
             <a:fld id="{CEA4F80E-EF3C-4D0E-A7E6-C20606EE442A}" type="datetimeFigureOut">
               <a:rPr lang="en-US" smtClean="0"/>
-              <a:t>9/26/2010</a:t>
+              <a:t>12/13/2010</a:t>
             </a:fld>
             <a:endParaRPr lang="en-US"/>
           </a:p>
@@ -2110,7 +2109,7 @@
           <a:p>
             <a:fld id="{CEA4F80E-EF3C-4D0E-A7E6-C20606EE442A}" type="datetimeFigureOut">
               <a:rPr lang="en-US" smtClean="0"/>
-              <a:t>9/26/2010</a:t>
+              <a:t>12/13/2010</a:t>
             </a:fld>
             <a:endParaRPr lang="en-US"/>
           </a:p>
@@ -2400,7 +2399,7 @@
           <a:p>
             <a:fld id="{CEA4F80E-EF3C-4D0E-A7E6-C20606EE442A}" type="datetimeFigureOut">
               <a:rPr lang="en-US" smtClean="0"/>
-              <a:t>9/26/2010</a:t>
+              <a:t>12/13/2010</a:t>
             </a:fld>
             <a:endParaRPr lang="en-US"/>
           </a:p>
@@ -2723,7 +2722,7 @@
           <a:p>
             <a:fld id="{CEA4F80E-EF3C-4D0E-A7E6-C20606EE442A}" type="datetimeFigureOut">
               <a:rPr lang="en-US" smtClean="0"/>
-              <a:t>9/26/2010</a:t>
+              <a:t>12/13/2010</a:t>
             </a:fld>
             <a:endParaRPr lang="en-US"/>
           </a:p>
@@ -3180,7 +3179,7 @@
           <a:p>
             <a:fld id="{CEA4F80E-EF3C-4D0E-A7E6-C20606EE442A}" type="datetimeFigureOut">
               <a:rPr lang="en-US" smtClean="0"/>
-              <a:t>9/26/2010</a:t>
+              <a:t>12/13/2010</a:t>
             </a:fld>
             <a:endParaRPr lang="en-US"/>
           </a:p>
@@ -3905,8 +3904,17 @@
           <a:p>
             <a:r>
               <a:rPr lang="en-US" dirty="0" smtClean="0"/>
-              <a:t>Ages 8+</a:t>
-            </a:r>
+              <a:t>Ages </a:t>
+            </a:r>
+            <a:r>
+              <a:rPr lang="en-US" dirty="0" smtClean="0"/>
+              <a:t>10</a:t>
+            </a:r>
+            <a:r>
+              <a:rPr lang="en-US" dirty="0" smtClean="0"/>
+              <a:t>+</a:t>
+            </a:r>
+            <a:endParaRPr lang="en-US" dirty="0" smtClean="0"/>
           </a:p>
           <a:p>
             <a:r>
@@ -3917,12 +3925,8 @@
           </a:p>
           <a:p>
             <a:r>
-              <a:rPr lang="en-US" smtClean="0"/>
-              <a:t>Need games that do </a:t>
-            </a:r>
-            <a:r>
               <a:rPr lang="en-US" dirty="0" smtClean="0"/>
-              <a:t>not depend on speed or other physical capabilities</a:t>
+              <a:t>Need games that do not depend on speed or other physical capabilities</a:t>
             </a:r>
           </a:p>
         </p:txBody>
@@ -3990,7 +3994,12 @@
             <p:ph idx="1"/>
           </p:nvPr>
         </p:nvSpPr>
-        <p:spPr/>
+        <p:spPr>
+          <a:xfrm>
+            <a:off x="2133600" y="685801"/>
+            <a:ext cx="6096000" cy="3886199"/>
+          </a:xfrm>
+        </p:spPr>
         <p:txBody>
           <a:bodyPr/>
           <a:lstStyle/>
@@ -4045,8 +4054,27 @@
             <a:pPr lvl="2"/>
             <a:r>
               <a:rPr lang="en-US" dirty="0" smtClean="0"/>
-              <a:t>Not required, but available for switch user</a:t>
-            </a:r>
+              <a:t>Not required, but available for switch </a:t>
+            </a:r>
+            <a:r>
+              <a:rPr lang="en-US" dirty="0" smtClean="0"/>
+              <a:t>user</a:t>
+            </a:r>
+          </a:p>
+          <a:p>
+            <a:pPr lvl="1"/>
+            <a:r>
+              <a:rPr lang="en-US" dirty="0" smtClean="0"/>
+              <a:t>Can be saved</a:t>
+            </a:r>
+          </a:p>
+          <a:p>
+            <a:pPr lvl="1"/>
+            <a:r>
+              <a:rPr lang="en-US" dirty="0" smtClean="0"/>
+              <a:t>Customizable background color, font size, and font color</a:t>
+            </a:r>
+            <a:endParaRPr lang="en-US" dirty="0" smtClean="0"/>
           </a:p>
         </p:txBody>
       </p:sp>
@@ -4113,7 +4141,12 @@
             <p:ph idx="1"/>
           </p:nvPr>
         </p:nvSpPr>
-        <p:spPr/>
+        <p:spPr>
+          <a:xfrm>
+            <a:off x="2133600" y="685801"/>
+            <a:ext cx="6096000" cy="4343399"/>
+          </a:xfrm>
+        </p:spPr>
         <p:txBody>
           <a:bodyPr/>
           <a:lstStyle/>
@@ -4138,8 +4171,55 @@
           <a:p>
             <a:r>
               <a:rPr lang="en-US" dirty="0" smtClean="0"/>
-              <a:t>Different ways to play through the game</a:t>
-            </a:r>
+              <a:t>Different ways to play through the </a:t>
+            </a:r>
+            <a:r>
+              <a:rPr lang="en-US" dirty="0" smtClean="0"/>
+              <a:t>game</a:t>
+            </a:r>
+          </a:p>
+          <a:p>
+            <a:r>
+              <a:rPr lang="en-US" dirty="0" smtClean="0"/>
+              <a:t>Different difficulties</a:t>
+            </a:r>
+            <a:endParaRPr lang="en-US" dirty="0" smtClean="0"/>
+          </a:p>
+          <a:p>
+            <a:r>
+              <a:rPr lang="en-US" dirty="0" smtClean="0"/>
+              <a:t>Mini games</a:t>
+            </a:r>
+            <a:endParaRPr lang="en-US" dirty="0"/>
+          </a:p>
+          <a:p>
+            <a:pPr lvl="1"/>
+            <a:r>
+              <a:rPr lang="en-US" dirty="0" smtClean="0"/>
+              <a:t>Combat</a:t>
+            </a:r>
+          </a:p>
+          <a:p>
+            <a:pPr lvl="1"/>
+            <a:r>
+              <a:rPr lang="en-US" dirty="0" smtClean="0"/>
+              <a:t>Lock picking</a:t>
+            </a:r>
+          </a:p>
+          <a:p>
+            <a:pPr lvl="1"/>
+            <a:r>
+              <a:rPr lang="en-US" dirty="0" smtClean="0"/>
+              <a:t>Maze</a:t>
+            </a:r>
+          </a:p>
+          <a:p>
+            <a:pPr lvl="1"/>
+            <a:r>
+              <a:rPr lang="en-US" dirty="0" smtClean="0"/>
+              <a:t>Safecracking</a:t>
+            </a:r>
+            <a:endParaRPr lang="en-US" dirty="0" smtClean="0"/>
           </a:p>
           <a:p>
             <a:endParaRPr lang="en-US" dirty="0"/>
@@ -4257,126 +4337,6 @@
     <p:extLst>
       <p:ext uri="{BB962C8B-B14F-4D97-AF65-F5344CB8AC3E}">
         <p14:creationId xmlns:p14="http://schemas.microsoft.com/office/powerpoint/2010/main" val="1980632529"/>
-      </p:ext>
-    </p:extLst>
-  </p:cSld>
-  <p:clrMapOvr>
-    <a:masterClrMapping/>
-  </p:clrMapOvr>
-</p:sld>
-</file>
-
-<file path=ppt/slides/slide7.xml><?xml version="1.0" encoding="utf-8"?>
-<p:sld xmlns:a="http://schemas.openxmlformats.org/drawingml/2006/main" xmlns:r="http://schemas.openxmlformats.org/officeDocument/2006/relationships" xmlns:p="http://schemas.openxmlformats.org/presentationml/2006/main">
-  <p:cSld>
-    <p:spTree>
-      <p:nvGrpSpPr>
-        <p:cNvPr id="1" name=""/>
-        <p:cNvGrpSpPr/>
-        <p:nvPr/>
-      </p:nvGrpSpPr>
-      <p:grpSpPr>
-        <a:xfrm>
-          <a:off x="0" y="0"/>
-          <a:ext cx="0" cy="0"/>
-          <a:chOff x="0" y="0"/>
-          <a:chExt cx="0" cy="0"/>
-        </a:xfrm>
-      </p:grpSpPr>
-      <p:sp>
-        <p:nvSpPr>
-          <p:cNvPr id="2" name="Content Placeholder 1"/>
-          <p:cNvSpPr>
-            <a:spLocks noGrp="1"/>
-          </p:cNvSpPr>
-          <p:nvPr>
-            <p:ph idx="1"/>
-          </p:nvPr>
-        </p:nvSpPr>
-        <p:spPr/>
-        <p:txBody>
-          <a:bodyPr/>
-          <a:lstStyle/>
-          <a:p>
-            <a:r>
-              <a:rPr lang="en-US" dirty="0" smtClean="0"/>
-              <a:t>Add mini games</a:t>
-            </a:r>
-          </a:p>
-          <a:p>
-            <a:pPr lvl="1"/>
-            <a:r>
-              <a:rPr lang="en-US" dirty="0" smtClean="0"/>
-              <a:t>Lock picking, safe combo, maze</a:t>
-            </a:r>
-          </a:p>
-          <a:p>
-            <a:r>
-              <a:rPr lang="en-US" dirty="0" smtClean="0"/>
-              <a:t>Add tiered menu available at any point</a:t>
-            </a:r>
-          </a:p>
-          <a:p>
-            <a:r>
-              <a:rPr lang="en-US" dirty="0" smtClean="0"/>
-              <a:t>Improve GUI</a:t>
-            </a:r>
-          </a:p>
-          <a:p>
-            <a:r>
-              <a:rPr lang="en-US" dirty="0" smtClean="0"/>
-              <a:t>Add graphics and audio</a:t>
-            </a:r>
-          </a:p>
-          <a:p>
-            <a:r>
-              <a:rPr lang="en-US" dirty="0" smtClean="0"/>
-              <a:t>Add more content</a:t>
-            </a:r>
-          </a:p>
-          <a:p>
-            <a:r>
-              <a:rPr lang="en-US" dirty="0" smtClean="0"/>
-              <a:t>Make extendable for future</a:t>
-            </a:r>
-          </a:p>
-          <a:p>
-            <a:pPr lvl="1"/>
-            <a:r>
-              <a:rPr lang="en-US" dirty="0" smtClean="0"/>
-              <a:t>Stretch goal of user interface for adding content</a:t>
-            </a:r>
-            <a:endParaRPr lang="en-US" dirty="0"/>
-          </a:p>
-        </p:txBody>
-      </p:sp>
-      <p:sp>
-        <p:nvSpPr>
-          <p:cNvPr id="3" name="Title 2"/>
-          <p:cNvSpPr>
-            <a:spLocks noGrp="1"/>
-          </p:cNvSpPr>
-          <p:nvPr>
-            <p:ph type="title"/>
-          </p:nvPr>
-        </p:nvSpPr>
-        <p:spPr/>
-        <p:txBody>
-          <a:bodyPr/>
-          <a:lstStyle/>
-          <a:p>
-            <a:r>
-              <a:rPr lang="en-US" dirty="0" smtClean="0"/>
-              <a:t>Goals</a:t>
-            </a:r>
-            <a:endParaRPr lang="en-US" dirty="0"/>
-          </a:p>
-        </p:txBody>
-      </p:sp>
-    </p:spTree>
-    <p:extLst>
-      <p:ext uri="{BB962C8B-B14F-4D97-AF65-F5344CB8AC3E}">
-        <p14:creationId xmlns:p14="http://schemas.microsoft.com/office/powerpoint/2010/main" val="3423689840"/>
       </p:ext>
     </p:extLst>
   </p:cSld>

</xml_diff>